<commit_message>
Add implementation for storage management in DG
</commit_message>
<xml_diff>
--- a/docs/diagrams/ExportSequenceDiagram.pptx
+++ b/docs/diagrams/ExportSequenceDiagram.pptx
@@ -212,7 +212,7 @@
           <a:p>
             <a:fld id="{F5CC4B3F-88C1-4FFA-B1B6-F41C21DC6924}" type="datetimeFigureOut">
               <a:rPr lang="en-US" smtClean="0"/>
-              <a:t>4/13/2018</a:t>
+              <a:t>4/15/2018</a:t>
             </a:fld>
             <a:endParaRPr lang="en-US"/>
           </a:p>
@@ -658,7 +658,7 @@
           <a:p>
             <a:fld id="{78C97017-6FC3-485B-9764-EAC9E56C1D49}" type="datetimeFigureOut">
               <a:rPr lang="en-US" smtClean="0"/>
-              <a:t>4/13/2018</a:t>
+              <a:t>4/15/2018</a:t>
             </a:fld>
             <a:endParaRPr lang="en-US"/>
           </a:p>
@@ -826,7 +826,7 @@
           <a:p>
             <a:fld id="{78C97017-6FC3-485B-9764-EAC9E56C1D49}" type="datetimeFigureOut">
               <a:rPr lang="en-US" smtClean="0"/>
-              <a:t>4/13/2018</a:t>
+              <a:t>4/15/2018</a:t>
             </a:fld>
             <a:endParaRPr lang="en-US"/>
           </a:p>
@@ -1004,7 +1004,7 @@
           <a:p>
             <a:fld id="{78C97017-6FC3-485B-9764-EAC9E56C1D49}" type="datetimeFigureOut">
               <a:rPr lang="en-US" smtClean="0"/>
-              <a:t>4/13/2018</a:t>
+              <a:t>4/15/2018</a:t>
             </a:fld>
             <a:endParaRPr lang="en-US"/>
           </a:p>
@@ -1172,7 +1172,7 @@
           <a:p>
             <a:fld id="{78C97017-6FC3-485B-9764-EAC9E56C1D49}" type="datetimeFigureOut">
               <a:rPr lang="en-US" smtClean="0"/>
-              <a:t>4/13/2018</a:t>
+              <a:t>4/15/2018</a:t>
             </a:fld>
             <a:endParaRPr lang="en-US"/>
           </a:p>
@@ -1417,7 +1417,7 @@
           <a:p>
             <a:fld id="{78C97017-6FC3-485B-9764-EAC9E56C1D49}" type="datetimeFigureOut">
               <a:rPr lang="en-US" smtClean="0"/>
-              <a:t>4/13/2018</a:t>
+              <a:t>4/15/2018</a:t>
             </a:fld>
             <a:endParaRPr lang="en-US"/>
           </a:p>
@@ -1702,7 +1702,7 @@
           <a:p>
             <a:fld id="{78C97017-6FC3-485B-9764-EAC9E56C1D49}" type="datetimeFigureOut">
               <a:rPr lang="en-US" smtClean="0"/>
-              <a:t>4/13/2018</a:t>
+              <a:t>4/15/2018</a:t>
             </a:fld>
             <a:endParaRPr lang="en-US"/>
           </a:p>
@@ -2121,7 +2121,7 @@
           <a:p>
             <a:fld id="{78C97017-6FC3-485B-9764-EAC9E56C1D49}" type="datetimeFigureOut">
               <a:rPr lang="en-US" smtClean="0"/>
-              <a:t>4/13/2018</a:t>
+              <a:t>4/15/2018</a:t>
             </a:fld>
             <a:endParaRPr lang="en-US"/>
           </a:p>
@@ -2238,7 +2238,7 @@
           <a:p>
             <a:fld id="{78C97017-6FC3-485B-9764-EAC9E56C1D49}" type="datetimeFigureOut">
               <a:rPr lang="en-US" smtClean="0"/>
-              <a:t>4/13/2018</a:t>
+              <a:t>4/15/2018</a:t>
             </a:fld>
             <a:endParaRPr lang="en-US"/>
           </a:p>
@@ -2333,7 +2333,7 @@
           <a:p>
             <a:fld id="{78C97017-6FC3-485B-9764-EAC9E56C1D49}" type="datetimeFigureOut">
               <a:rPr lang="en-US" smtClean="0"/>
-              <a:t>4/13/2018</a:t>
+              <a:t>4/15/2018</a:t>
             </a:fld>
             <a:endParaRPr lang="en-US"/>
           </a:p>
@@ -2608,7 +2608,7 @@
           <a:p>
             <a:fld id="{78C97017-6FC3-485B-9764-EAC9E56C1D49}" type="datetimeFigureOut">
               <a:rPr lang="en-US" smtClean="0"/>
-              <a:t>4/13/2018</a:t>
+              <a:t>4/15/2018</a:t>
             </a:fld>
             <a:endParaRPr lang="en-US"/>
           </a:p>
@@ -2860,7 +2860,7 @@
           <a:p>
             <a:fld id="{78C97017-6FC3-485B-9764-EAC9E56C1D49}" type="datetimeFigureOut">
               <a:rPr lang="en-US" smtClean="0"/>
-              <a:t>4/13/2018</a:t>
+              <a:t>4/15/2018</a:t>
             </a:fld>
             <a:endParaRPr lang="en-US"/>
           </a:p>
@@ -3071,7 +3071,7 @@
           <a:p>
             <a:fld id="{78C97017-6FC3-485B-9764-EAC9E56C1D49}" type="datetimeFigureOut">
               <a:rPr lang="en-US" smtClean="0"/>
-              <a:t>4/13/2018</a:t>
+              <a:t>4/15/2018</a:t>
             </a:fld>
             <a:endParaRPr lang="en-US"/>
           </a:p>
@@ -3629,7 +3629,7 @@
         <p:spPr>
           <a:xfrm>
             <a:off x="2387575" y="1318374"/>
-            <a:ext cx="0" cy="2597583"/>
+            <a:ext cx="0" cy="3975729"/>
           </a:xfrm>
           <a:prstGeom prst="line">
             <a:avLst/>
@@ -5615,6 +5615,16 @@
           <a:p>
             <a:pPr algn="ctr"/>
             <a:r>
+              <a:rPr lang="en-US" dirty="0" err="1" smtClean="0">
+                <a:solidFill>
+                  <a:schemeClr val="accent6">
+                    <a:lumMod val="75000"/>
+                  </a:schemeClr>
+                </a:solidFill>
+              </a:rPr>
+              <a:t>saveDeskBoard</a:t>
+            </a:r>
+            <a:r>
               <a:rPr lang="en-US" dirty="0" smtClean="0">
                 <a:solidFill>
                   <a:schemeClr val="accent6">
@@ -5622,7 +5632,7 @@
                   </a:schemeClr>
                 </a:solidFill>
               </a:rPr>
-              <a:t>exportDeskBoard(</a:t>
+              <a:t>(</a:t>
             </a:r>
             <a:r>
               <a:rPr lang="en-US" dirty="0" err="1" smtClean="0">
@@ -5770,7 +5780,7 @@
         <p:spPr>
           <a:xfrm>
             <a:off x="10775165" y="1359014"/>
-            <a:ext cx="0" cy="2830598"/>
+            <a:ext cx="0" cy="3091970"/>
           </a:xfrm>
           <a:prstGeom prst="line">
             <a:avLst/>

</xml_diff>